<commit_message>
changes to 2017 version
</commit_message>
<xml_diff>
--- a/MoLOverviewPoster2017.pptx
+++ b/MoLOverviewPoster2017.pptx
@@ -193,7 +193,7 @@
           <a:p>
             <a:fld id="{B179243D-0E3E-4D4F-90E9-F9F1DBB34143}" type="datetimeFigureOut">
               <a:rPr lang="en-US" smtClean="0"/>
-              <a:t>6/14/17</a:t>
+              <a:t>6/16/17</a:t>
             </a:fld>
             <a:endParaRPr lang="en-US"/>
           </a:p>
@@ -2914,10 +2914,10 @@
                 <a:ea typeface="Calibri"/>
                 <a:cs typeface="Calibri"/>
               </a:rPr>
-              <a:t>draft version</a:t>
-            </a:r>
-            <a:r>
-              <a:rPr lang="en-US" sz="2800" smtClean="0">
+              <a:t>version</a:t>
+            </a:r>
+            <a:r>
+              <a:rPr lang="en-US" sz="2800" dirty="0">
                 <a:solidFill>
                   <a:sysClr val="windowText" lastClr="000000"/>
                 </a:solidFill>
@@ -2925,10 +2925,10 @@
                 <a:ea typeface="Calibri"/>
                 <a:cs typeface="Calibri"/>
               </a:rPr>
-              <a:t>, </a:t>
-            </a:r>
-            <a:r>
-              <a:rPr lang="en-US" sz="2800" smtClean="0">
+              <a:t>:</a:t>
+            </a:r>
+            <a:r>
+              <a:rPr lang="en-US" sz="2800" dirty="0" smtClean="0">
                 <a:solidFill>
                   <a:sysClr val="windowText" lastClr="000000"/>
                 </a:solidFill>
@@ -2936,7 +2936,7 @@
                 <a:ea typeface="Calibri"/>
                 <a:cs typeface="Calibri"/>
               </a:rPr>
-              <a:t>14 </a:t>
+              <a:t> 16 </a:t>
             </a:r>
             <a:r>
               <a:rPr lang="en-US" sz="2800" dirty="0" smtClean="0">
@@ -3027,7 +3027,7 @@
         </p:nvGrpSpPr>
         <p:grpSpPr>
           <a:xfrm>
-            <a:off x="308803" y="233917"/>
+            <a:off x="308801" y="308286"/>
             <a:ext cx="42185534" cy="29603657"/>
             <a:chOff x="1132721" y="281816"/>
             <a:chExt cx="42185535" cy="29603656"/>
@@ -3329,8 +3329,8 @@
           </p:nvSpPr>
           <p:spPr>
             <a:xfrm rot="10800000">
-              <a:off x="11843896" y="9976141"/>
-              <a:ext cx="22945172" cy="14600737"/>
+              <a:off x="11843895" y="9976141"/>
+              <a:ext cx="22945172" cy="14497760"/>
             </a:xfrm>
             <a:prstGeom prst="corner">
               <a:avLst>
@@ -4125,7 +4125,18 @@
               </a:r>
               <a:r>
                 <a:rPr lang="en-US" sz="2900" dirty="0"/>
-                <a:t>-FNWI] Dynamic Epistemic Logic (</a:t>
+                <a:t>-FNWI] Dynamic Epistemic Logic </a:t>
+              </a:r>
+              <a:r>
+                <a:rPr lang="en-US" sz="2900" dirty="0" smtClean="0"/>
+                <a:t/>
+              </a:r>
+              <a:br>
+                <a:rPr lang="en-US" sz="2900" dirty="0" smtClean="0"/>
+              </a:br>
+              <a:r>
+                <a:rPr lang="en-US" sz="2900" dirty="0" smtClean="0"/>
+                <a:t>(</a:t>
               </a:r>
               <a:r>
                 <a:rPr lang="en-US" sz="2900" dirty="0" err="1"/>
@@ -4301,7 +4312,15 @@
                       <a:srgbClr val="FFFFFF"/>
                     </a:solidFill>
                   </a:rPr>
-                  <a:t>Math Proof Methods for Logic</a:t>
+                  <a:t>Math </a:t>
+                </a:r>
+                <a:r>
+                  <a:rPr lang="en-US" sz="2900" dirty="0" smtClean="0">
+                    <a:solidFill>
+                      <a:srgbClr val="FFFFFF"/>
+                    </a:solidFill>
+                  </a:rPr>
+                  <a:t>Proof Methods for Logic</a:t>
                 </a:r>
                 <a:br>
                   <a:rPr lang="en-US" sz="2900" dirty="0" smtClean="0">
@@ -5280,8 +5299,8 @@
           </p:nvSpPr>
           <p:spPr>
             <a:xfrm>
-              <a:off x="30380341" y="10299806"/>
-              <a:ext cx="3276000" cy="2430000"/>
+              <a:off x="30574830" y="10444070"/>
+              <a:ext cx="2887022" cy="2141472"/>
             </a:xfrm>
             <a:prstGeom prst="roundRect">
               <a:avLst>
@@ -5968,9 +5987,9 @@
         <p:grpSpPr>
           <a:xfrm>
             <a:off x="5959666" y="432692"/>
-            <a:ext cx="19173764" cy="9280933"/>
+            <a:ext cx="19333206" cy="9280933"/>
             <a:chOff x="6159691" y="432692"/>
-            <a:chExt cx="19173764" cy="9280933"/>
+            <a:chExt cx="19333206" cy="9280933"/>
           </a:xfrm>
         </p:grpSpPr>
         <p:sp>
@@ -6329,7 +6348,38 @@
                   <a:ea typeface="Calibri" charset="0"/>
                   <a:cs typeface="Calibri" charset="0"/>
                 </a:rPr>
-                <a:t>, Knowledge and Science (Smets)</a:t>
+                <a:t>, Knowledge and Science </a:t>
+              </a:r>
+              <a:r>
+                <a:rPr lang="en-US" sz="2900" dirty="0" smtClean="0">
+                  <a:latin typeface="Calibri" charset="0"/>
+                  <a:ea typeface="Calibri" charset="0"/>
+                  <a:cs typeface="Calibri" charset="0"/>
+                </a:rPr>
+                <a:t/>
+              </a:r>
+              <a:br>
+                <a:rPr lang="en-US" sz="2900" dirty="0" smtClean="0">
+                  <a:latin typeface="Calibri" charset="0"/>
+                  <a:ea typeface="Calibri" charset="0"/>
+                  <a:cs typeface="Calibri" charset="0"/>
+                </a:rPr>
+              </a:br>
+              <a:r>
+                <a:rPr lang="en-US" sz="2900" dirty="0" smtClean="0">
+                  <a:latin typeface="Calibri" charset="0"/>
+                  <a:ea typeface="Calibri" charset="0"/>
+                  <a:cs typeface="Calibri" charset="0"/>
+                </a:rPr>
+                <a:t>(</a:t>
+              </a:r>
+              <a:r>
+                <a:rPr lang="en-US" sz="2900" dirty="0">
+                  <a:latin typeface="Calibri" charset="0"/>
+                  <a:ea typeface="Calibri" charset="0"/>
+                  <a:cs typeface="Calibri" charset="0"/>
+                </a:rPr>
+                <a:t>Smets)</a:t>
               </a:r>
             </a:p>
           </p:txBody>
@@ -6615,8 +6665,8 @@
           </p:nvSpPr>
           <p:spPr>
             <a:xfrm>
-              <a:off x="22057455" y="7138534"/>
-              <a:ext cx="3276000" cy="2430000"/>
+              <a:off x="22057454" y="7138534"/>
+              <a:ext cx="3435443" cy="2430000"/>
             </a:xfrm>
             <a:prstGeom prst="roundRect">
               <a:avLst>
@@ -6710,7 +6760,11 @@
               </a:r>
               <a:r>
                 <a:rPr lang="en-US" sz="2900" dirty="0" smtClean="0"/>
-                <a:t>odern Practice (</a:t>
+                <a:t>odern Practice </a:t>
+              </a:r>
+              <a:r>
+                <a:rPr lang="en-US" sz="2900" dirty="0" smtClean="0"/>
+                <a:t>(</a:t>
               </a:r>
               <a:r>
                 <a:rPr lang="en-US" sz="2900" dirty="0"/>
@@ -6911,7 +6965,38 @@
                     <a:schemeClr val="tx1"/>
                   </a:solidFill>
                 </a:rPr>
-                <a:t>Probability: Theory  (TBA) </a:t>
+                <a:t>Probability: Theory  </a:t>
+              </a:r>
+              <a:r>
+                <a:rPr lang="en-US" sz="2900" dirty="0" smtClean="0">
+                  <a:solidFill>
+                    <a:schemeClr val="tx1"/>
+                  </a:solidFill>
+                </a:rPr>
+                <a:t/>
+              </a:r>
+              <a:br>
+                <a:rPr lang="en-US" sz="2900" dirty="0" smtClean="0">
+                  <a:solidFill>
+                    <a:schemeClr val="tx1"/>
+                  </a:solidFill>
+                </a:rPr>
+              </a:br>
+              <a:r>
+                <a:rPr lang="en-US" sz="2900" dirty="0" smtClean="0">
+                  <a:solidFill>
+                    <a:schemeClr val="tx1"/>
+                  </a:solidFill>
+                </a:rPr>
+                <a:t>(</a:t>
+              </a:r>
+              <a:r>
+                <a:rPr lang="en-US" sz="2900" dirty="0" smtClean="0">
+                  <a:solidFill>
+                    <a:schemeClr val="tx1"/>
+                  </a:solidFill>
+                </a:rPr>
+                <a:t>TBA) </a:t>
               </a:r>
               <a:r>
                 <a:rPr lang="en-US" sz="2900" dirty="0">
@@ -7281,8 +7366,8 @@
           </p:nvSpPr>
           <p:spPr>
             <a:xfrm>
-              <a:off x="30451845" y="22166067"/>
-              <a:ext cx="3276000" cy="2182525"/>
+              <a:off x="30608462" y="22270408"/>
+              <a:ext cx="2962766" cy="1973844"/>
             </a:xfrm>
             <a:prstGeom prst="roundRect">
               <a:avLst>
@@ -7344,7 +7429,46 @@
                     </a:schemeClr>
                   </a:solidFill>
                 </a:rPr>
-                <a:t>-FNWI] Computability and Interaction (Baeten)</a:t>
+                <a:t>-FNWI] Computability and Interaction </a:t>
+              </a:r>
+              <a:r>
+                <a:rPr lang="en-US" sz="2900" dirty="0" smtClean="0">
+                  <a:solidFill>
+                    <a:schemeClr val="dk1">
+                      <a:alpha val="50000"/>
+                    </a:schemeClr>
+                  </a:solidFill>
+                </a:rPr>
+                <a:t/>
+              </a:r>
+              <a:br>
+                <a:rPr lang="en-US" sz="2900" dirty="0" smtClean="0">
+                  <a:solidFill>
+                    <a:schemeClr val="dk1">
+                      <a:alpha val="50000"/>
+                    </a:schemeClr>
+                  </a:solidFill>
+                </a:rPr>
+              </a:br>
+              <a:r>
+                <a:rPr lang="en-US" sz="2900" dirty="0" smtClean="0">
+                  <a:solidFill>
+                    <a:schemeClr val="dk1">
+                      <a:alpha val="50000"/>
+                    </a:schemeClr>
+                  </a:solidFill>
+                </a:rPr>
+                <a:t>(</a:t>
+              </a:r>
+              <a:r>
+                <a:rPr lang="en-US" sz="2900" dirty="0">
+                  <a:solidFill>
+                    <a:schemeClr val="dk1">
+                      <a:alpha val="50000"/>
+                    </a:schemeClr>
+                  </a:solidFill>
+                </a:rPr>
+                <a:t>Baeten)</a:t>
               </a:r>
             </a:p>
           </p:txBody>
@@ -8026,10 +8150,10 @@
         </p:nvGrpSpPr>
         <p:grpSpPr>
           <a:xfrm>
-            <a:off x="1150239" y="18131055"/>
-            <a:ext cx="19603421" cy="11039432"/>
-            <a:chOff x="381997" y="18034804"/>
-            <a:chExt cx="19603421" cy="11039433"/>
+            <a:off x="891970" y="18131055"/>
+            <a:ext cx="19692644" cy="11215501"/>
+            <a:chOff x="123728" y="18034804"/>
+            <a:chExt cx="19692644" cy="11215502"/>
           </a:xfrm>
         </p:grpSpPr>
         <p:sp>
@@ -8196,11 +8320,7 @@
               </a:br>
               <a:r>
                 <a:rPr lang="en-US" sz="2900" dirty="0" smtClean="0"/>
-                <a:t>Modal </a:t>
-              </a:r>
-              <a:r>
-                <a:rPr lang="en-US" sz="2900" dirty="0" smtClean="0"/>
-                <a:t>Logic</a:t>
+                <a:t>Modal Logic</a:t>
               </a:r>
               <a:br>
                 <a:rPr lang="en-US" sz="2900" dirty="0" smtClean="0"/>
@@ -8229,8 +8349,8 @@
           </p:nvSpPr>
           <p:spPr>
             <a:xfrm>
-              <a:off x="16709418" y="24826544"/>
-              <a:ext cx="3276000" cy="2429821"/>
+              <a:off x="16878464" y="24951926"/>
+              <a:ext cx="2937908" cy="2179058"/>
             </a:xfrm>
             <a:prstGeom prst="roundRect">
               <a:avLst>
@@ -8338,8 +8458,8 @@
           </p:nvSpPr>
           <p:spPr>
             <a:xfrm>
-              <a:off x="12949190" y="26597675"/>
-              <a:ext cx="3276000" cy="2429822"/>
+              <a:off x="12985573" y="26624660"/>
+              <a:ext cx="3203234" cy="2375852"/>
             </a:xfrm>
             <a:prstGeom prst="roundRect">
               <a:avLst>
@@ -8893,8 +9013,8 @@
           </p:nvSpPr>
           <p:spPr>
             <a:xfrm>
-              <a:off x="381997" y="23152777"/>
-              <a:ext cx="3139347" cy="2489237"/>
+              <a:off x="123728" y="22947992"/>
+              <a:ext cx="3655886" cy="2898808"/>
             </a:xfrm>
             <a:prstGeom prst="roundRect">
               <a:avLst>
@@ -9030,8 +9150,8 @@
           </p:nvSpPr>
           <p:spPr>
             <a:xfrm>
-              <a:off x="5377870" y="26585000"/>
-              <a:ext cx="3276000" cy="2489237"/>
+              <a:off x="5146152" y="26408932"/>
+              <a:ext cx="3739436" cy="2841374"/>
             </a:xfrm>
             <a:prstGeom prst="roundRect">
               <a:avLst>
@@ -9094,7 +9214,22 @@
               </a:r>
               <a:r>
                 <a:rPr lang="en-US" sz="2900" dirty="0"/>
-                <a:t> Theory (van </a:t>
+                <a:t> Theory </a:t>
+              </a:r>
+              <a:r>
+                <a:rPr lang="en-US" sz="2900" dirty="0" smtClean="0"/>
+                <a:t/>
+              </a:r>
+              <a:br>
+                <a:rPr lang="en-US" sz="2900" dirty="0" smtClean="0"/>
+              </a:br>
+              <a:r>
+                <a:rPr lang="en-US" sz="2900" dirty="0" smtClean="0"/>
+                <a:t>(</a:t>
+              </a:r>
+              <a:r>
+                <a:rPr lang="en-US" sz="2900" dirty="0"/>
+                <a:t>van </a:t>
               </a:r>
               <a:r>
                 <a:rPr lang="en-US" sz="2900" dirty="0" err="1"/>
@@ -10570,8 +10705,8 @@
         </p:nvSpPr>
         <p:spPr>
           <a:xfrm>
-            <a:off x="38842935" y="19059689"/>
-            <a:ext cx="3276000" cy="2744812"/>
+            <a:off x="38716645" y="19029104"/>
+            <a:ext cx="3520838" cy="2744812"/>
           </a:xfrm>
           <a:prstGeom prst="roundRect">
             <a:avLst>
@@ -10635,7 +10770,15 @@
                   <a:srgbClr val="FFFFFF"/>
                 </a:solidFill>
               </a:rPr>
-              <a:t>] Machine Learning Theory</a:t>
+              <a:t>] </a:t>
+            </a:r>
+            <a:r>
+              <a:rPr lang="en-US" sz="2900" dirty="0" smtClean="0">
+                <a:solidFill>
+                  <a:srgbClr val="FFFFFF"/>
+                </a:solidFill>
+              </a:rPr>
+              <a:t/>
             </a:r>
             <a:br>
               <a:rPr lang="en-US" sz="2900" dirty="0" smtClean="0">
@@ -10650,15 +10793,7 @@
                   <a:srgbClr val="FFFFFF"/>
                 </a:solidFill>
               </a:rPr>
-              <a:t>(</a:t>
-            </a:r>
-            <a:r>
-              <a:rPr lang="en-US" sz="2900" dirty="0" err="1" smtClean="0">
-                <a:solidFill>
-                  <a:srgbClr val="FFFFFF"/>
-                </a:solidFill>
-              </a:rPr>
-              <a:t>Koolen</a:t>
+              <a:t>Machine </a:t>
             </a:r>
             <a:r>
               <a:rPr lang="en-US" sz="2900" dirty="0" smtClean="0">
@@ -10666,39 +10801,7 @@
                   <a:srgbClr val="FFFFFF"/>
                 </a:solidFill>
               </a:rPr>
-              <a:t>, </a:t>
-            </a:r>
-            <a:r>
-              <a:rPr lang="en-US" sz="2900" dirty="0" err="1" smtClean="0">
-                <a:solidFill>
-                  <a:srgbClr val="FFFFFF"/>
-                </a:solidFill>
-              </a:rPr>
-              <a:t>Grünwald</a:t>
-            </a:r>
-            <a:r>
-              <a:rPr lang="en-US" sz="2900" dirty="0" smtClean="0">
-                <a:solidFill>
-                  <a:srgbClr val="FFFFFF"/>
-                </a:solidFill>
-              </a:rPr>
-              <a:t>, </a:t>
-            </a:r>
-            <a:r>
-              <a:rPr lang="en-US" sz="2900" dirty="0" err="1" smtClean="0">
-                <a:solidFill>
-                  <a:srgbClr val="FFFFFF"/>
-                </a:solidFill>
-              </a:rPr>
-              <a:t>dHeide</a:t>
-            </a:r>
-            <a:r>
-              <a:rPr lang="en-US" sz="2900" dirty="0" smtClean="0">
-                <a:solidFill>
-                  <a:srgbClr val="FFFFFF"/>
-                </a:solidFill>
-              </a:rPr>
-              <a:t>)</a:t>
+              <a:t>Learning Theory</a:t>
             </a:r>
             <a:br>
               <a:rPr lang="en-US" sz="2900" dirty="0" smtClean="0">
@@ -10713,7 +10816,63 @@
                   <a:srgbClr val="FFFFFF"/>
                 </a:solidFill>
               </a:rPr>
-              <a:t>[8EC</a:t>
+              <a:t>(</a:t>
+            </a:r>
+            <a:r>
+              <a:rPr lang="en-US" sz="2900" dirty="0" err="1" smtClean="0">
+                <a:solidFill>
+                  <a:srgbClr val="FFFFFF"/>
+                </a:solidFill>
+              </a:rPr>
+              <a:t>Koolen</a:t>
+            </a:r>
+            <a:r>
+              <a:rPr lang="en-US" sz="2900" dirty="0" smtClean="0">
+                <a:solidFill>
+                  <a:srgbClr val="FFFFFF"/>
+                </a:solidFill>
+              </a:rPr>
+              <a:t>, </a:t>
+            </a:r>
+            <a:r>
+              <a:rPr lang="en-US" sz="2900" dirty="0" err="1" smtClean="0">
+                <a:solidFill>
+                  <a:srgbClr val="FFFFFF"/>
+                </a:solidFill>
+              </a:rPr>
+              <a:t>Grünwald</a:t>
+            </a:r>
+            <a:r>
+              <a:rPr lang="en-US" sz="2900" dirty="0" smtClean="0">
+                <a:solidFill>
+                  <a:srgbClr val="FFFFFF"/>
+                </a:solidFill>
+              </a:rPr>
+              <a:t>, </a:t>
+            </a:r>
+            <a:r>
+              <a:rPr lang="en-US" sz="2900" dirty="0" err="1" smtClean="0">
+                <a:solidFill>
+                  <a:srgbClr val="FFFFFF"/>
+                </a:solidFill>
+              </a:rPr>
+              <a:t>dHeide</a:t>
+            </a:r>
+            <a:r>
+              <a:rPr lang="en-US" sz="2900" dirty="0" smtClean="0">
+                <a:solidFill>
+                  <a:srgbClr val="FFFFFF"/>
+                </a:solidFill>
+              </a:rPr>
+              <a:t>) [</a:t>
+            </a:r>
+            <a:r>
+              <a:rPr lang="en-US" sz="2900" dirty="0" smtClean="0">
+                <a:solidFill>
+                  <a:srgbClr val="FFFFFF"/>
+                </a:solidFill>
+              </a:rPr>
+              <a:t>8EC</a:t>
             </a:r>
             <a:r>
               <a:rPr lang="en-US" sz="2900" dirty="0">

</xml_diff>

<commit_message>
write out Dutch names
</commit_message>
<xml_diff>
--- a/MoLOverviewPoster2017.pptx
+++ b/MoLOverviewPoster2017.pptx
@@ -193,7 +193,7 @@
           <a:p>
             <a:fld id="{B179243D-0E3E-4D4F-90E9-F9F1DBB34143}" type="datetimeFigureOut">
               <a:rPr lang="en-US" smtClean="0"/>
-              <a:t>6/20/17</a:t>
+              <a:t>7/4/17</a:t>
             </a:fld>
             <a:endParaRPr lang="en-US"/>
           </a:p>
@@ -2936,7 +2936,29 @@
                 <a:ea typeface="Calibri"/>
                 <a:cs typeface="Calibri"/>
               </a:rPr>
-              <a:t> 20 June </a:t>
+              <a:t> </a:t>
+            </a:r>
+            <a:r>
+              <a:rPr lang="en-US" sz="2800" smtClean="0">
+                <a:solidFill>
+                  <a:sysClr val="windowText" lastClr="000000"/>
+                </a:solidFill>
+                <a:latin typeface="Calibri"/>
+                <a:ea typeface="Calibri"/>
+                <a:cs typeface="Calibri"/>
+              </a:rPr>
+              <a:t>4 July</a:t>
+            </a:r>
+            <a:r>
+              <a:rPr lang="en-US" sz="2800" smtClean="0">
+                <a:solidFill>
+                  <a:sysClr val="windowText" lastClr="000000"/>
+                </a:solidFill>
+                <a:latin typeface="Calibri"/>
+                <a:ea typeface="Calibri"/>
+                <a:cs typeface="Calibri"/>
+              </a:rPr>
+              <a:t> </a:t>
             </a:r>
             <a:r>
               <a:rPr lang="en-US" sz="2800" dirty="0" smtClean="0">
@@ -5097,7 +5119,46 @@
                     <a:srgbClr val="FFFFFF"/>
                   </a:solidFill>
                 </a:rPr>
-                <a:t>Representation (vHarmelen)</a:t>
+                <a:t>Representation </a:t>
+              </a:r>
+              <a:r>
+                <a:rPr lang="en-US" sz="2900" dirty="0" smtClean="0">
+                  <a:solidFill>
+                    <a:srgbClr val="FFFFFF"/>
+                  </a:solidFill>
+                </a:rPr>
+                <a:t/>
+              </a:r>
+              <a:br>
+                <a:rPr lang="en-US" sz="2900" dirty="0" smtClean="0">
+                  <a:solidFill>
+                    <a:srgbClr val="FFFFFF"/>
+                  </a:solidFill>
+                </a:rPr>
+              </a:br>
+              <a:r>
+                <a:rPr lang="en-US" sz="2900" dirty="0" smtClean="0">
+                  <a:solidFill>
+                    <a:srgbClr val="FFFFFF"/>
+                  </a:solidFill>
+                </a:rPr>
+                <a:t>(van </a:t>
+              </a:r>
+              <a:r>
+                <a:rPr lang="en-US" sz="2900" dirty="0" err="1" smtClean="0">
+                  <a:solidFill>
+                    <a:srgbClr val="FFFFFF"/>
+                  </a:solidFill>
+                </a:rPr>
+                <a:t>Harmelen</a:t>
+              </a:r>
+              <a:r>
+                <a:rPr lang="en-US" sz="2900" dirty="0">
+                  <a:solidFill>
+                    <a:srgbClr val="FFFFFF"/>
+                  </a:solidFill>
+                </a:rPr>
+                <a:t>)</a:t>
               </a:r>
             </a:p>
           </p:txBody>
@@ -5564,7 +5625,6 @@
                 <a:rPr lang="en-US" sz="2900" dirty="0"/>
                 <a:t>(Lentz)</a:t>
               </a:r>
-              <a:endParaRPr lang="en-US" sz="2900" dirty="0"/>
             </a:p>
           </p:txBody>
         </p:sp>
@@ -6114,15 +6174,38 @@
                     <a:srgbClr val="FFFFFF"/>
                   </a:solidFill>
                 </a:rPr>
-                <a:t>[MoL-FGW] Rationality, Cognition and Reasoning (</a:t>
-              </a:r>
-              <a:r>
-                <a:rPr lang="en-US" sz="2900" dirty="0" err="1">
+                <a:t>[MoL-FGW] Rationality, Cognition and Reasoning </a:t>
+              </a:r>
+              <a:r>
+                <a:rPr lang="en-US" sz="2900" dirty="0" smtClean="0">
                   <a:solidFill>
                     <a:srgbClr val="FFFFFF"/>
                   </a:solidFill>
                 </a:rPr>
-                <a:t>vLambalgen</a:t>
+                <a:t/>
+              </a:r>
+              <a:br>
+                <a:rPr lang="en-US" sz="2900" dirty="0" smtClean="0">
+                  <a:solidFill>
+                    <a:srgbClr val="FFFFFF"/>
+                  </a:solidFill>
+                </a:rPr>
+              </a:br>
+              <a:r>
+                <a:rPr lang="en-US" sz="2900" dirty="0" smtClean="0">
+                  <a:solidFill>
+                    <a:srgbClr val="FFFFFF"/>
+                  </a:solidFill>
+                </a:rPr>
+                <a:t>(van </a:t>
+              </a:r>
+              <a:r>
+                <a:rPr lang="en-US" sz="2900" dirty="0" err="1" smtClean="0">
+                  <a:solidFill>
+                    <a:srgbClr val="FFFFFF"/>
+                  </a:solidFill>
+                </a:rPr>
+                <a:t>Lambalgen</a:t>
               </a:r>
               <a:r>
                 <a:rPr lang="en-US" sz="2900" dirty="0">
@@ -6622,7 +6705,26 @@
               </a:r>
               <a:r>
                 <a:rPr lang="en-US" sz="2900" dirty="0"/>
-                <a:t>, Logic and Cognition (vLambalgen)</a:t>
+                <a:t>, Logic and Cognition </a:t>
+              </a:r>
+              <a:r>
+                <a:rPr lang="en-US" sz="2900" dirty="0" smtClean="0"/>
+                <a:t/>
+              </a:r>
+              <a:br>
+                <a:rPr lang="en-US" sz="2900" dirty="0" smtClean="0"/>
+              </a:br>
+              <a:r>
+                <a:rPr lang="en-US" sz="2900" dirty="0" smtClean="0"/>
+                <a:t>(van </a:t>
+              </a:r>
+              <a:r>
+                <a:rPr lang="en-US" sz="2900" dirty="0" err="1" smtClean="0"/>
+                <a:t>Lambalgen</a:t>
+              </a:r>
+              <a:r>
+                <a:rPr lang="en-US" sz="2900" dirty="0"/>
+                <a:t>)</a:t>
               </a:r>
             </a:p>
           </p:txBody>
@@ -7387,8 +7489,8 @@
                 <a:t>(</a:t>
               </a:r>
               <a:r>
-                <a:rPr lang="en-US" sz="2900" dirty="0" err="1"/>
-                <a:t>dWolf</a:t>
+                <a:rPr lang="en-US" sz="2900" dirty="0" smtClean="0"/>
+                <a:t>de Wolf</a:t>
               </a:r>
               <a:r>
                 <a:rPr lang="en-US" sz="2900" dirty="0" smtClean="0"/>
@@ -8528,7 +8630,7 @@
                 <a:t>Category Theory (</a:t>
               </a:r>
               <a:r>
-                <a:rPr lang="en-US" sz="2900" dirty="0" err="1" smtClean="0">
+                <a:rPr lang="en-US" sz="2900" dirty="0" smtClean="0">
                   <a:solidFill>
                     <a:schemeClr val="dk1">
                       <a:alpha val="25000"/>
@@ -8538,7 +8640,7 @@
                   <a:ea typeface="Calibri" charset="0"/>
                   <a:cs typeface="Calibri" charset="0"/>
                 </a:rPr>
-                <a:t>vdBerg</a:t>
+                <a:t>van den Berg</a:t>
               </a:r>
               <a:r>
                 <a:rPr lang="en-US" sz="2900" dirty="0" smtClean="0">
@@ -8573,11 +8675,6 @@
                 </a:rPr>
                 <a:t>in 2018/19 only</a:t>
               </a:r>
-              <a:endParaRPr lang="en-US" sz="2900" dirty="0" smtClean="0">
-                <a:latin typeface="Calibri" charset="0"/>
-                <a:ea typeface="Calibri" charset="0"/>
-                <a:cs typeface="Calibri" charset="0"/>
-              </a:endParaRPr>
             </a:p>
           </p:txBody>
         </p:sp>
@@ -8842,7 +8939,22 @@
                 </a:r>
                 <a:r>
                   <a:rPr lang="en-US" sz="2900" dirty="0"/>
-                  <a:t>Theory (vdBerg)</a:t>
+                  <a:t>Theory </a:t>
+                </a:r>
+                <a:r>
+                  <a:rPr lang="en-US" sz="2900" dirty="0" smtClean="0"/>
+                  <a:t/>
+                </a:r>
+                <a:br>
+                  <a:rPr lang="en-US" sz="2900" dirty="0" smtClean="0"/>
+                </a:br>
+                <a:r>
+                  <a:rPr lang="en-US" sz="2900" dirty="0" smtClean="0"/>
+                  <a:t>(van den Berg</a:t>
+                </a:r>
+                <a:r>
+                  <a:rPr lang="en-US" sz="2900" dirty="0"/>
+                  <a:t>)</a:t>
                 </a:r>
               </a:p>
             </p:txBody>
@@ -9479,8 +9591,8 @@
                 <a:t>(</a:t>
               </a:r>
               <a:r>
-                <a:rPr lang="en-US" sz="2900" dirty="0" err="1" smtClean="0"/>
-                <a:t>vdBerg</a:t>
+                <a:rPr lang="en-US" sz="2900" dirty="0" smtClean="0"/>
+                <a:t>van den Berg</a:t>
               </a:r>
               <a:r>
                 <a:rPr lang="en-US" sz="2900" dirty="0" smtClean="0"/>
@@ -10098,7 +10210,19 @@
                 </a:r>
                 <a:r>
                   <a:rPr lang="en-US" sz="2900" dirty="0"/>
-                  <a:t>-FNWI] Philosophical Logic (vRooij)</a:t>
+                  <a:t>-FNWI] Philosophical Logic (</a:t>
+                </a:r>
+                <a:r>
+                  <a:rPr lang="en-US" sz="2900" dirty="0" smtClean="0"/>
+                  <a:t>van </a:t>
+                </a:r>
+                <a:r>
+                  <a:rPr lang="en-US" sz="2900" dirty="0" err="1" smtClean="0"/>
+                  <a:t>Rooij</a:t>
+                </a:r>
+                <a:r>
+                  <a:rPr lang="en-US" sz="2900" dirty="0"/>
+                  <a:t>)</a:t>
                 </a:r>
               </a:p>
             </p:txBody>
@@ -10231,8 +10355,16 @@
                 <a:t>(</a:t>
               </a:r>
               <a:r>
+                <a:rPr lang="en-US" sz="2900" dirty="0" smtClean="0"/>
+                <a:t>van </a:t>
+              </a:r>
+              <a:r>
+                <a:rPr lang="en-US" sz="2900" dirty="0" err="1" smtClean="0"/>
+                <a:t>Lambalgen</a:t>
+              </a:r>
+              <a:r>
                 <a:rPr lang="en-US" sz="2900" dirty="0"/>
-                <a:t>vLambalgen)</a:t>
+                <a:t>)</a:t>
               </a:r>
             </a:p>
           </p:txBody>
@@ -10985,12 +11117,12 @@
               <a:t>, </a:t>
             </a:r>
             <a:r>
-              <a:rPr lang="en-US" sz="2900" dirty="0" err="1" smtClean="0">
+              <a:rPr lang="en-US" sz="2900" dirty="0" smtClean="0">
                 <a:solidFill>
                   <a:srgbClr val="FFFFFF"/>
                 </a:solidFill>
               </a:rPr>
-              <a:t>dHeide</a:t>
+              <a:t>de Heide</a:t>
             </a:r>
             <a:r>
               <a:rPr lang="en-US" sz="2900" dirty="0" smtClean="0">

</xml_diff>

<commit_message>
change color of set theory
</commit_message>
<xml_diff>
--- a/MoLOverviewPoster2017.pptx
+++ b/MoLOverviewPoster2017.pptx
@@ -193,7 +193,7 @@
           <a:p>
             <a:fld id="{B179243D-0E3E-4D4F-90E9-F9F1DBB34143}" type="datetimeFigureOut">
               <a:rPr lang="en-US" smtClean="0"/>
-              <a:t>7/4/17</a:t>
+              <a:t>7/5/17</a:t>
             </a:fld>
             <a:endParaRPr lang="en-US"/>
           </a:p>
@@ -2917,7 +2917,7 @@
               <a:t>version</a:t>
             </a:r>
             <a:r>
-              <a:rPr lang="en-US" sz="2800">
+              <a:rPr lang="en-US" sz="2800" dirty="0">
                 <a:solidFill>
                   <a:sysClr val="windowText" lastClr="000000"/>
                 </a:solidFill>
@@ -2928,7 +2928,7 @@
               <a:t>:</a:t>
             </a:r>
             <a:r>
-              <a:rPr lang="en-US" sz="2800" smtClean="0">
+              <a:rPr lang="en-US" sz="2800" dirty="0" smtClean="0">
                 <a:solidFill>
                   <a:sysClr val="windowText" lastClr="000000"/>
                 </a:solidFill>
@@ -2939,28 +2939,6 @@
               <a:t> </a:t>
             </a:r>
             <a:r>
-              <a:rPr lang="en-US" sz="2800" smtClean="0">
-                <a:solidFill>
-                  <a:sysClr val="windowText" lastClr="000000"/>
-                </a:solidFill>
-                <a:latin typeface="Calibri"/>
-                <a:ea typeface="Calibri"/>
-                <a:cs typeface="Calibri"/>
-              </a:rPr>
-              <a:t>4 July</a:t>
-            </a:r>
-            <a:r>
-              <a:rPr lang="en-US" sz="2800" smtClean="0">
-                <a:solidFill>
-                  <a:sysClr val="windowText" lastClr="000000"/>
-                </a:solidFill>
-                <a:latin typeface="Calibri"/>
-                <a:ea typeface="Calibri"/>
-                <a:cs typeface="Calibri"/>
-              </a:rPr>
-              <a:t> </a:t>
-            </a:r>
-            <a:r>
               <a:rPr lang="en-US" sz="2800" dirty="0" smtClean="0">
                 <a:solidFill>
                   <a:sysClr val="windowText" lastClr="000000"/>
@@ -2969,7 +2947,18 @@
                 <a:ea typeface="Calibri"/>
                 <a:cs typeface="Calibri"/>
               </a:rPr>
-              <a:t>2017: </a:t>
+              <a:t>5 </a:t>
+            </a:r>
+            <a:r>
+              <a:rPr lang="en-US" sz="2800" dirty="0" smtClean="0">
+                <a:solidFill>
+                  <a:sysClr val="windowText" lastClr="000000"/>
+                </a:solidFill>
+                <a:latin typeface="Calibri"/>
+                <a:ea typeface="Calibri"/>
+                <a:cs typeface="Calibri"/>
+              </a:rPr>
+              <a:t>July 2017: </a:t>
             </a:r>
             <a:br>
               <a:rPr lang="en-US" sz="2800" dirty="0" smtClean="0">
@@ -7486,15 +7475,7 @@
               </a:br>
               <a:r>
                 <a:rPr lang="en-US" sz="2900" dirty="0" smtClean="0"/>
-                <a:t>(</a:t>
-              </a:r>
-              <a:r>
-                <a:rPr lang="en-US" sz="2900" dirty="0" smtClean="0"/>
-                <a:t>de Wolf</a:t>
-              </a:r>
-              <a:r>
-                <a:rPr lang="en-US" sz="2900" dirty="0" smtClean="0"/>
-                <a:t>)</a:t>
+                <a:t>(de Wolf)</a:t>
               </a:r>
             </a:p>
             <a:p>
@@ -7879,10 +7860,10 @@
           </p:nvGrpSpPr>
           <p:grpSpPr>
             <a:xfrm>
-              <a:off x="34514378" y="24486098"/>
-              <a:ext cx="3632245" cy="2631670"/>
-              <a:chOff x="42832838" y="30745052"/>
-              <a:chExt cx="3632245" cy="2631670"/>
+              <a:off x="34514378" y="24415760"/>
+              <a:ext cx="3632245" cy="2702008"/>
+              <a:chOff x="42832838" y="30674714"/>
+              <a:chExt cx="3632245" cy="2702008"/>
             </a:xfrm>
           </p:grpSpPr>
           <p:sp>
@@ -8072,7 +8053,7 @@
             </p:nvSpPr>
             <p:spPr>
               <a:xfrm>
-                <a:off x="43837318" y="30745052"/>
+                <a:off x="43837318" y="30674714"/>
                 <a:ext cx="1497972" cy="1204325"/>
               </a:xfrm>
               <a:prstGeom prst="rect">
@@ -8640,20 +8621,7 @@
                   <a:ea typeface="Calibri" charset="0"/>
                   <a:cs typeface="Calibri" charset="0"/>
                 </a:rPr>
-                <a:t>van den Berg</a:t>
-              </a:r>
-              <a:r>
-                <a:rPr lang="en-US" sz="2900" dirty="0" smtClean="0">
-                  <a:solidFill>
-                    <a:schemeClr val="dk1">
-                      <a:alpha val="25000"/>
-                    </a:schemeClr>
-                  </a:solidFill>
-                  <a:latin typeface="Calibri" charset="0"/>
-                  <a:ea typeface="Calibri" charset="0"/>
-                  <a:cs typeface="Calibri" charset="0"/>
-                </a:rPr>
-                <a:t>)</a:t>
+                <a:t>van den Berg)</a:t>
               </a:r>
               <a:br>
                 <a:rPr lang="en-US" sz="2900" dirty="0" smtClean="0">
@@ -9267,16 +9235,15 @@
             <a:gradFill flip="none" rotWithShape="1">
               <a:gsLst>
                 <a:gs pos="0">
-                  <a:srgbClr val="C8B2E9"/>
-                </a:gs>
-                <a:gs pos="35000">
-                  <a:srgbClr val="D8C9EE"/>
+                  <a:schemeClr val="accent3"/>
                 </a:gs>
                 <a:gs pos="100000">
-                  <a:srgbClr val="FFD1BB"/>
+                  <a:schemeClr val="accent1">
+                    <a:lumMod val="75000"/>
+                  </a:schemeClr>
                 </a:gs>
               </a:gsLst>
-              <a:lin ang="5400000" scaled="0"/>
+              <a:lin ang="16200000" scaled="0"/>
             </a:gradFill>
             <a:ln w="76200" cap="flat">
               <a:solidFill>
@@ -9286,9 +9253,9 @@
               <a:bevel/>
             </a:ln>
             <a:effectLst>
-              <a:outerShdw blurRad="38100" dist="20000" dir="5400000" rotWithShape="0">
+              <a:outerShdw blurRad="38100" dist="23000" dir="5400000" rotWithShape="0">
                 <a:srgbClr val="000000">
-                  <a:alpha val="38000"/>
+                  <a:alpha val="35000"/>
                 </a:srgbClr>
               </a:outerShdw>
             </a:effectLst>
@@ -9300,57 +9267,113 @@
             <a:lstStyle/>
             <a:p>
               <a:pPr algn="ctr"/>
-              <a:endParaRPr lang="en-US" sz="2900" dirty="0" smtClean="0"/>
+              <a:endParaRPr lang="en-US" sz="2900" dirty="0">
+                <a:solidFill>
+                  <a:srgbClr val="FFFFFF"/>
+                </a:solidFill>
+              </a:endParaRPr>
             </a:p>
             <a:p>
               <a:pPr algn="ctr"/>
               <a:r>
-                <a:rPr lang="en-US" sz="2900" dirty="0" smtClean="0"/>
+                <a:rPr lang="en-US" sz="2900" dirty="0">
+                  <a:solidFill>
+                    <a:srgbClr val="FFFFFF"/>
+                  </a:solidFill>
+                </a:rPr>
                 <a:t>[</a:t>
               </a:r>
               <a:r>
-                <a:rPr lang="en-US" sz="2900" dirty="0" err="1"/>
+                <a:rPr lang="en-US" sz="2900" dirty="0" err="1">
+                  <a:solidFill>
+                    <a:srgbClr val="FFFFFF"/>
+                  </a:solidFill>
+                </a:rPr>
                 <a:t>MastMath-UvA</a:t>
               </a:r>
               <a:r>
-                <a:rPr lang="en-US" sz="2900" dirty="0"/>
+                <a:rPr lang="en-US" sz="2900" dirty="0">
+                  <a:solidFill>
+                    <a:srgbClr val="FFFFFF"/>
+                  </a:solidFill>
+                </a:rPr>
                 <a:t>] </a:t>
               </a:r>
               <a:r>
-                <a:rPr lang="en-US" sz="2900" dirty="0" smtClean="0"/>
+                <a:rPr lang="en-US" sz="2900" dirty="0">
+                  <a:solidFill>
+                    <a:srgbClr val="FFFFFF"/>
+                  </a:solidFill>
+                </a:rPr>
                 <a:t/>
               </a:r>
               <a:br>
-                <a:rPr lang="en-US" sz="2900" dirty="0" smtClean="0"/>
+                <a:rPr lang="en-US" sz="2900" dirty="0">
+                  <a:solidFill>
+                    <a:srgbClr val="FFFFFF"/>
+                  </a:solidFill>
+                </a:rPr>
               </a:br>
               <a:r>
-                <a:rPr lang="en-US" sz="2900" dirty="0" smtClean="0"/>
+                <a:rPr lang="en-US" sz="2900" dirty="0">
+                  <a:solidFill>
+                    <a:srgbClr val="FFFFFF"/>
+                  </a:solidFill>
+                </a:rPr>
                 <a:t>Set </a:t>
               </a:r>
               <a:r>
-                <a:rPr lang="en-US" sz="2900" dirty="0"/>
+                <a:rPr lang="en-US" sz="2900" dirty="0">
+                  <a:solidFill>
+                    <a:srgbClr val="FFFFFF"/>
+                  </a:solidFill>
+                </a:rPr>
                 <a:t>Theory </a:t>
               </a:r>
               <a:br>
-                <a:rPr lang="en-US" sz="2900" dirty="0"/>
+                <a:rPr lang="en-US" sz="2900" dirty="0">
+                  <a:solidFill>
+                    <a:srgbClr val="FFFFFF"/>
+                  </a:solidFill>
+                </a:rPr>
               </a:br>
               <a:r>
-                <a:rPr lang="en-US" sz="2900" dirty="0"/>
+                <a:rPr lang="en-US" sz="2900" dirty="0">
+                  <a:solidFill>
+                    <a:srgbClr val="FFFFFF"/>
+                  </a:solidFill>
+                </a:rPr>
                 <a:t>(Hart, </a:t>
               </a:r>
               <a:r>
-                <a:rPr lang="en-US" sz="2900" dirty="0" err="1"/>
+                <a:rPr lang="en-US" sz="2900" dirty="0" err="1">
+                  <a:solidFill>
+                    <a:srgbClr val="FFFFFF"/>
+                  </a:solidFill>
+                </a:rPr>
                 <a:t>Löwe</a:t>
               </a:r>
               <a:r>
-                <a:rPr lang="en-US" sz="2900" dirty="0"/>
+                <a:rPr lang="en-US" sz="2900" dirty="0">
+                  <a:solidFill>
+                    <a:srgbClr val="FFFFFF"/>
+                  </a:solidFill>
+                </a:rPr>
                 <a:t>) </a:t>
               </a:r>
               <a:br>
-                <a:rPr lang="en-US" sz="2900" dirty="0"/>
+                <a:rPr lang="en-US" sz="2900" dirty="0">
+                  <a:solidFill>
+                    <a:srgbClr val="FFFFFF"/>
+                  </a:solidFill>
+                </a:rPr>
               </a:br>
               <a:r>
-                <a:rPr lang="en-US" sz="2900" dirty="0"/>
+                <a:rPr lang="en-US" sz="2900" dirty="0">
+                  <a:solidFill>
+                    <a:srgbClr val="FFFFFF"/>
+                  </a:solidFill>
+                </a:rPr>
                 <a:t>[8EC]</a:t>
               </a:r>
             </a:p>
@@ -9393,10 +9416,18 @@
                 <a:defRPr sz="1800"/>
               </a:pPr>
               <a:r>
-                <a:rPr lang="en-US" sz="3300" b="1" dirty="0"/>
+                <a:rPr lang="en-US" sz="3300" b="1" dirty="0">
+                  <a:solidFill>
+                    <a:schemeClr val="bg1"/>
+                  </a:solidFill>
+                </a:rPr>
                 <a:t>L&amp;M</a:t>
               </a:r>
-              <a:endParaRPr sz="3300" b="1" dirty="0"/>
+              <a:endParaRPr sz="3300" b="1" dirty="0">
+                <a:solidFill>
+                  <a:schemeClr val="bg1"/>
+                </a:solidFill>
+              </a:endParaRPr>
             </a:p>
           </p:txBody>
         </p:sp>
@@ -9588,15 +9619,7 @@
               </a:br>
               <a:r>
                 <a:rPr lang="en-US" sz="2900" dirty="0" smtClean="0"/>
-                <a:t>(</a:t>
-              </a:r>
-              <a:r>
-                <a:rPr lang="en-US" sz="2900" dirty="0" smtClean="0"/>
-                <a:t>van den Berg</a:t>
-              </a:r>
-              <a:r>
-                <a:rPr lang="en-US" sz="2900" dirty="0" smtClean="0"/>
-                <a:t>)</a:t>
+                <a:t>(van den Berg)</a:t>
               </a:r>
               <a:endParaRPr lang="en-US" sz="2900" dirty="0"/>
             </a:p>
@@ -10352,11 +10375,7 @@
               </a:br>
               <a:r>
                 <a:rPr lang="en-US" sz="2900" dirty="0" smtClean="0"/>
-                <a:t>(</a:t>
-              </a:r>
-              <a:r>
-                <a:rPr lang="en-US" sz="2900" dirty="0" smtClean="0"/>
-                <a:t>van </a:t>
+                <a:t>(van </a:t>
               </a:r>
               <a:r>
                 <a:rPr lang="en-US" sz="2900" dirty="0" err="1" smtClean="0"/>
@@ -10584,8 +10603,8 @@
         </p:nvSpPr>
         <p:spPr>
           <a:xfrm>
-            <a:off x="1915195" y="17980252"/>
-            <a:ext cx="2063777" cy="1204326"/>
+            <a:off x="1828738" y="17999302"/>
+            <a:ext cx="2170871" cy="1204326"/>
           </a:xfrm>
           <a:prstGeom prst="rect">
             <a:avLst/>
@@ -10601,7 +10620,7 @@
         </p:spPr>
         <p:txBody>
           <a:bodyPr lIns="208758" tIns="208758" rIns="208758" bIns="208758" anchor="ctr">
-            <a:normAutofit fontScale="92500"/>
+            <a:noAutofit/>
           </a:bodyPr>
           <a:lstStyle>
             <a:lvl1pPr>
@@ -10613,7 +10632,7 @@
               <a:defRPr sz="1800"/>
             </a:pPr>
             <a:r>
-              <a:rPr lang="en-US" sz="3300" b="1" smtClean="0">
+              <a:rPr lang="en-US" sz="3300" b="1" dirty="0" smtClean="0">
                 <a:solidFill>
                   <a:schemeClr val="bg1"/>
                 </a:solidFill>
@@ -11114,23 +11133,7 @@
                   <a:srgbClr val="FFFFFF"/>
                 </a:solidFill>
               </a:rPr>
-              <a:t>, </a:t>
-            </a:r>
-            <a:r>
-              <a:rPr lang="en-US" sz="2900" dirty="0" smtClean="0">
-                <a:solidFill>
-                  <a:srgbClr val="FFFFFF"/>
-                </a:solidFill>
-              </a:rPr>
-              <a:t>de Heide</a:t>
-            </a:r>
-            <a:r>
-              <a:rPr lang="en-US" sz="2900" dirty="0" smtClean="0">
-                <a:solidFill>
-                  <a:srgbClr val="FFFFFF"/>
-                </a:solidFill>
-              </a:rPr>
-              <a:t>) [8EC</a:t>
+              <a:t>, de Heide) [8EC</a:t>
             </a:r>
             <a:r>
               <a:rPr lang="en-US" sz="2900" dirty="0">

</xml_diff>

<commit_message>
changed color of term rewriting
</commit_message>
<xml_diff>
--- a/MoLOverviewPoster2017.pptx
+++ b/MoLOverviewPoster2017.pptx
@@ -193,7 +193,7 @@
           <a:p>
             <a:fld id="{B179243D-0E3E-4D4F-90E9-F9F1DBB34143}" type="datetimeFigureOut">
               <a:rPr lang="en-US" smtClean="0"/>
-              <a:t>7/5/17</a:t>
+              <a:t>9/15/17</a:t>
             </a:fld>
             <a:endParaRPr lang="en-US"/>
           </a:p>
@@ -2939,6 +2939,17 @@
               <a:t> </a:t>
             </a:r>
             <a:r>
+              <a:rPr lang="en-US" sz="2800" smtClean="0">
+                <a:solidFill>
+                  <a:sysClr val="windowText" lastClr="000000"/>
+                </a:solidFill>
+                <a:latin typeface="Calibri"/>
+                <a:ea typeface="Calibri"/>
+                <a:cs typeface="Calibri"/>
+              </a:rPr>
+              <a:t>15 September </a:t>
+            </a:r>
+            <a:r>
               <a:rPr lang="en-US" sz="2800" dirty="0" smtClean="0">
                 <a:solidFill>
                   <a:sysClr val="windowText" lastClr="000000"/>
@@ -2947,18 +2958,7 @@
                 <a:ea typeface="Calibri"/>
                 <a:cs typeface="Calibri"/>
               </a:rPr>
-              <a:t>5 </a:t>
-            </a:r>
-            <a:r>
-              <a:rPr lang="en-US" sz="2800" dirty="0" smtClean="0">
-                <a:solidFill>
-                  <a:sysClr val="windowText" lastClr="000000"/>
-                </a:solidFill>
-                <a:latin typeface="Calibri"/>
-                <a:ea typeface="Calibri"/>
-                <a:cs typeface="Calibri"/>
-              </a:rPr>
-              <a:t>July 2017: </a:t>
+              <a:t>2017: </a:t>
             </a:r>
             <a:br>
               <a:rPr lang="en-US" sz="2800" dirty="0" smtClean="0">
@@ -8114,133 +8114,132 @@
                 <a:gd name="adj" fmla="val 16667"/>
               </a:avLst>
             </a:prstGeom>
-            <a:ln/>
+            <a:gradFill flip="none" rotWithShape="1">
+              <a:gsLst>
+                <a:gs pos="0">
+                  <a:srgbClr val="FFD1BB"/>
+                </a:gs>
+                <a:gs pos="35000">
+                  <a:srgbClr val="FFDECF"/>
+                </a:gs>
+                <a:gs pos="100000">
+                  <a:srgbClr val="FFF2ED"/>
+                </a:gs>
+              </a:gsLst>
+              <a:lin ang="16200000" scaled="0"/>
+            </a:gradFill>
+            <a:ln w="9525" cap="flat">
+              <a:solidFill>
+                <a:srgbClr val="F69240"/>
+              </a:solidFill>
+              <a:prstDash val="solid"/>
+              <a:bevel/>
+            </a:ln>
+            <a:effectLst>
+              <a:outerShdw blurRad="38100" dist="20000" dir="5400000" rotWithShape="0">
+                <a:srgbClr val="000000">
+                  <a:alpha val="38000"/>
+                </a:srgbClr>
+              </a:outerShdw>
+            </a:effectLst>
           </p:spPr>
-          <p:style>
-            <a:lnRef idx="1">
-              <a:schemeClr val="accent3"/>
-            </a:lnRef>
-            <a:fillRef idx="2">
-              <a:schemeClr val="accent3"/>
-            </a:fillRef>
-            <a:effectRef idx="1">
-              <a:schemeClr val="accent3"/>
-            </a:effectRef>
-            <a:fontRef idx="minor">
-              <a:schemeClr val="dk1"/>
-            </a:fontRef>
-          </p:style>
           <p:txBody>
             <a:bodyPr wrap="square" lIns="0" tIns="0" rIns="0" bIns="0" numCol="1" anchor="ctr">
               <a:noAutofit/>
             </a:bodyPr>
             <a:lstStyle/>
             <a:p>
-              <a:pPr lvl="0" algn="ctr">
-                <a:defRPr sz="1800">
-                  <a:solidFill>
-                    <a:srgbClr val="000000"/>
-                  </a:solidFill>
-                </a:defRPr>
-              </a:pPr>
-              <a:r>
-                <a:rPr lang="en-US" sz="2900" dirty="0" smtClean="0">
-                  <a:solidFill>
-                    <a:schemeClr val="tx1"/>
-                  </a:solidFill>
+              <a:pPr algn="ctr"/>
+              <a:r>
+                <a:rPr lang="en-US" sz="2900" dirty="0">
+                  <a:latin typeface="Calibri"/>
+                  <a:ea typeface="Calibri"/>
+                  <a:cs typeface="Calibri"/>
                 </a:rPr>
                 <a:t>[</a:t>
               </a:r>
               <a:r>
-                <a:rPr lang="en-US" sz="2900" dirty="0" err="1" smtClean="0">
-                  <a:solidFill>
-                    <a:schemeClr val="tx1"/>
-                  </a:solidFill>
+                <a:rPr lang="en-US" sz="2900" dirty="0" err="1">
+                  <a:latin typeface="Calibri"/>
+                  <a:ea typeface="Calibri"/>
+                  <a:cs typeface="Calibri"/>
                 </a:rPr>
                 <a:t>MScCS</a:t>
               </a:r>
               <a:r>
-                <a:rPr lang="en-US" sz="2900" dirty="0" smtClean="0">
-                  <a:solidFill>
-                    <a:schemeClr val="tx1"/>
-                  </a:solidFill>
+                <a:rPr lang="en-US" sz="2900" dirty="0">
+                  <a:latin typeface="Calibri"/>
+                  <a:ea typeface="Calibri"/>
+                  <a:cs typeface="Calibri"/>
                 </a:rPr>
                 <a:t>-VU]</a:t>
               </a:r>
               <a:br>
-                <a:rPr lang="en-US" sz="2900" dirty="0" smtClean="0">
-                  <a:solidFill>
-                    <a:schemeClr val="tx1"/>
-                  </a:solidFill>
+                <a:rPr lang="en-US" sz="2900" dirty="0">
+                  <a:latin typeface="Calibri"/>
+                  <a:ea typeface="Calibri"/>
+                  <a:cs typeface="Calibri"/>
                 </a:rPr>
               </a:br>
               <a:r>
-                <a:rPr lang="en-US" sz="2900" smtClean="0">
-                  <a:solidFill>
-                    <a:schemeClr val="tx1"/>
-                  </a:solidFill>
+                <a:rPr lang="en-US" sz="2900" dirty="0">
+                  <a:latin typeface="Calibri"/>
+                  <a:ea typeface="Calibri"/>
+                  <a:cs typeface="Calibri"/>
                 </a:rPr>
                 <a:t>Term Rewriting </a:t>
               </a:r>
               <a:r>
                 <a:rPr lang="en-US" sz="2900" dirty="0">
-                  <a:solidFill>
-                    <a:schemeClr val="tx1"/>
-                  </a:solidFill>
+                  <a:latin typeface="Calibri"/>
+                  <a:ea typeface="Calibri"/>
+                  <a:cs typeface="Calibri"/>
                 </a:rPr>
                 <a:t>S</a:t>
               </a:r>
               <a:r>
-                <a:rPr lang="en-US" sz="2900" smtClean="0">
-                  <a:solidFill>
-                    <a:schemeClr val="tx1"/>
-                  </a:solidFill>
+                <a:rPr lang="en-US" sz="2900" dirty="0">
+                  <a:latin typeface="Calibri"/>
+                  <a:ea typeface="Calibri"/>
+                  <a:cs typeface="Calibri"/>
                 </a:rPr>
                 <a:t>ystems</a:t>
               </a:r>
-              <a:r>
-                <a:rPr lang="en-US" sz="2900" dirty="0" smtClean="0">
-                  <a:solidFill>
-                    <a:schemeClr val="tx1"/>
-                  </a:solidFill>
-                </a:rPr>
-                <a:t/>
-              </a:r>
               <a:br>
-                <a:rPr lang="en-US" sz="2900" dirty="0" smtClean="0">
-                  <a:solidFill>
-                    <a:schemeClr val="tx1"/>
-                  </a:solidFill>
+                <a:rPr lang="en-US" sz="2900" dirty="0">
+                  <a:latin typeface="Calibri"/>
+                  <a:ea typeface="Calibri"/>
+                  <a:cs typeface="Calibri"/>
                 </a:rPr>
               </a:br>
               <a:r>
-                <a:rPr lang="en-US" sz="2900" dirty="0" smtClean="0">
-                  <a:solidFill>
-                    <a:schemeClr val="tx1"/>
-                  </a:solidFill>
+                <a:rPr lang="en-US" sz="2900" dirty="0">
+                  <a:latin typeface="Calibri"/>
+                  <a:ea typeface="Calibri"/>
+                  <a:cs typeface="Calibri"/>
                 </a:rPr>
                 <a:t>(</a:t>
               </a:r>
               <a:r>
-                <a:rPr lang="en-US" sz="2900" dirty="0" err="1" smtClean="0">
-                  <a:solidFill>
-                    <a:schemeClr val="tx1"/>
-                  </a:solidFill>
+                <a:rPr lang="en-US" sz="2900" dirty="0" err="1">
+                  <a:latin typeface="Calibri"/>
+                  <a:ea typeface="Calibri"/>
+                  <a:cs typeface="Calibri"/>
                 </a:rPr>
                 <a:t>Endrullis</a:t>
               </a:r>
               <a:r>
-                <a:rPr lang="en-US" sz="2900" dirty="0" smtClean="0">
-                  <a:solidFill>
-                    <a:schemeClr val="tx1"/>
-                  </a:solidFill>
+                <a:rPr lang="en-US" sz="2900" dirty="0">
+                  <a:latin typeface="Calibri"/>
+                  <a:ea typeface="Calibri"/>
+                  <a:cs typeface="Calibri"/>
                 </a:rPr>
                 <a:t>)</a:t>
               </a:r>
               <a:endParaRPr lang="en-US" sz="2900" dirty="0">
-                <a:solidFill>
-                  <a:schemeClr val="tx1"/>
-                </a:solidFill>
+                <a:latin typeface="Calibri"/>
+                <a:ea typeface="Calibri"/>
+                <a:cs typeface="Calibri"/>
               </a:endParaRPr>
             </a:p>
           </p:txBody>
@@ -9299,14 +9298,6 @@
                 </a:rPr>
                 <a:t>] </a:t>
               </a:r>
-              <a:r>
-                <a:rPr lang="en-US" sz="2900" dirty="0">
-                  <a:solidFill>
-                    <a:srgbClr val="FFFFFF"/>
-                  </a:solidFill>
-                </a:rPr>
-                <a:t/>
-              </a:r>
               <a:br>
                 <a:rPr lang="en-US" sz="2900" dirty="0">
                   <a:solidFill>
@@ -9320,15 +9311,7 @@
                     <a:srgbClr val="FFFFFF"/>
                   </a:solidFill>
                 </a:rPr>
-                <a:t>Set </a:t>
-              </a:r>
-              <a:r>
-                <a:rPr lang="en-US" sz="2900" dirty="0">
-                  <a:solidFill>
-                    <a:srgbClr val="FFFFFF"/>
-                  </a:solidFill>
-                </a:rPr>
-                <a:t>Theory </a:t>
+                <a:t>Set Theory </a:t>
               </a:r>
               <a:br>
                 <a:rPr lang="en-US" sz="2900" dirty="0">

</xml_diff>

<commit_message>
update of Basic Probability
</commit_message>
<xml_diff>
--- a/MoLOverviewPoster2017.pptx
+++ b/MoLOverviewPoster2017.pptx
@@ -2936,40 +2936,7 @@
                 <a:ea typeface="Calibri"/>
                 <a:cs typeface="Calibri"/>
               </a:rPr>
-              <a:t> </a:t>
-            </a:r>
-            <a:r>
-              <a:rPr lang="en-US" sz="2800" dirty="0" smtClean="0">
-                <a:solidFill>
-                  <a:sysClr val="windowText" lastClr="000000"/>
-                </a:solidFill>
-                <a:latin typeface="Calibri"/>
-                <a:ea typeface="Calibri"/>
-                <a:cs typeface="Calibri"/>
-              </a:rPr>
-              <a:t>13</a:t>
-            </a:r>
-            <a:r>
-              <a:rPr lang="en-US" sz="2800" dirty="0" smtClean="0">
-                <a:solidFill>
-                  <a:sysClr val="windowText" lastClr="000000"/>
-                </a:solidFill>
-                <a:latin typeface="Calibri"/>
-                <a:ea typeface="Calibri"/>
-                <a:cs typeface="Calibri"/>
-              </a:rPr>
-              <a:t> December </a:t>
-            </a:r>
-            <a:r>
-              <a:rPr lang="en-US" sz="2800" dirty="0" smtClean="0">
-                <a:solidFill>
-                  <a:sysClr val="windowText" lastClr="000000"/>
-                </a:solidFill>
-                <a:latin typeface="Calibri"/>
-                <a:ea typeface="Calibri"/>
-                <a:cs typeface="Calibri"/>
-              </a:rPr>
-              <a:t>2017: </a:t>
+              <a:t> 13 December 2017: </a:t>
             </a:r>
             <a:br>
               <a:rPr lang="en-US" sz="2800" dirty="0" smtClean="0">
@@ -4945,8 +4912,8 @@
         </p:nvSpPr>
         <p:spPr>
           <a:xfrm>
-            <a:off x="39224415" y="22345090"/>
-            <a:ext cx="2914062" cy="2915570"/>
+            <a:off x="38477563" y="22241187"/>
+            <a:ext cx="3740404" cy="3006525"/>
           </a:xfrm>
           <a:prstGeom prst="ellipse">
             <a:avLst/>
@@ -4987,12 +4954,39 @@
               <a:t>-FNWI] Basic Probability: Programming  </a:t>
             </a:r>
             <a:r>
+              <a:rPr lang="en-US" sz="2900" dirty="0"/>
+              <a:t>(</a:t>
+            </a:r>
+            <a:r>
+              <a:rPr lang="en-US" sz="2900" dirty="0" err="1" smtClean="0"/>
+              <a:t>Dotlacil</a:t>
+            </a:r>
+            <a:r>
               <a:rPr lang="en-US" sz="2900" dirty="0" smtClean="0"/>
-              <a:t>(TBA) </a:t>
+              <a:t> &amp; </a:t>
+            </a:r>
+            <a:r>
+              <a:rPr lang="en-US" sz="2900" dirty="0" err="1"/>
+              <a:t>Cremers</a:t>
             </a:r>
             <a:r>
               <a:rPr lang="en-US" sz="2900" dirty="0"/>
-              <a:t>[3EC]</a:t>
+              <a:t>) </a:t>
+            </a:r>
+            <a:r>
+              <a:rPr lang="en-US" sz="2900" dirty="0" smtClean="0"/>
+              <a:t/>
+            </a:r>
+            <a:br>
+              <a:rPr lang="en-US" sz="2900" dirty="0" smtClean="0"/>
+            </a:br>
+            <a:r>
+              <a:rPr lang="en-US" sz="2900" dirty="0" smtClean="0"/>
+              <a:t>[</a:t>
+            </a:r>
+            <a:r>
+              <a:rPr lang="en-US" sz="2900" dirty="0"/>
+              <a:t>3EC]</a:t>
             </a:r>
           </a:p>
         </p:txBody>
@@ -7052,9 +7046,9 @@
         <p:grpSpPr>
           <a:xfrm>
             <a:off x="21551570" y="21941689"/>
-            <a:ext cx="20028667" cy="7746522"/>
+            <a:ext cx="20557817" cy="7746522"/>
             <a:chOff x="21551570" y="21941689"/>
-            <a:chExt cx="20028667" cy="7746522"/>
+            <a:chExt cx="20557817" cy="7746522"/>
           </a:xfrm>
         </p:grpSpPr>
         <p:sp>
@@ -7067,8 +7061,8 @@
           </p:nvSpPr>
           <p:spPr>
             <a:xfrm>
-              <a:off x="38716645" y="25491365"/>
-              <a:ext cx="2863592" cy="2865074"/>
+              <a:off x="38474065" y="25343333"/>
+              <a:ext cx="3635322" cy="3160520"/>
             </a:xfrm>
             <a:prstGeom prst="ellipse">
               <a:avLst/>
@@ -7147,7 +7141,42 @@
                     <a:schemeClr val="tx1"/>
                   </a:solidFill>
                 </a:rPr>
-                <a:t>(TBA) </a:t>
+                <a:t>(</a:t>
+              </a:r>
+              <a:r>
+                <a:rPr lang="en-US" sz="2900" dirty="0" err="1"/>
+                <a:t>Dotlacil</a:t>
+              </a:r>
+              <a:r>
+                <a:rPr lang="en-US" sz="2900" dirty="0"/>
+                <a:t> &amp; </a:t>
+              </a:r>
+              <a:r>
+                <a:rPr lang="en-US" sz="2900" dirty="0" err="1"/>
+                <a:t>Cremers</a:t>
+              </a:r>
+              <a:r>
+                <a:rPr lang="en-US" sz="2900" smtClean="0">
+                  <a:solidFill>
+                    <a:schemeClr val="tx1"/>
+                  </a:solidFill>
+                </a:rPr>
+                <a:t>) </a:t>
+              </a:r>
+              <a:br>
+                <a:rPr lang="en-US" sz="2900" smtClean="0">
+                  <a:solidFill>
+                    <a:schemeClr val="tx1"/>
+                  </a:solidFill>
+                </a:rPr>
+              </a:br>
+              <a:r>
+                <a:rPr lang="en-US" sz="2900" smtClean="0">
+                  <a:solidFill>
+                    <a:schemeClr val="tx1"/>
+                  </a:solidFill>
+                </a:rPr>
+                <a:t>[</a:t>
               </a:r>
               <a:r>
                 <a:rPr lang="en-US" sz="2900" dirty="0">
@@ -7155,7 +7184,7 @@
                     <a:schemeClr val="tx1"/>
                   </a:solidFill>
                 </a:rPr>
-                <a:t>[3EC]</a:t>
+                <a:t>3EC]</a:t>
               </a:r>
             </a:p>
           </p:txBody>

</xml_diff>

<commit_message>
updating Game Theory to TBA
</commit_message>
<xml_diff>
--- a/MoLOverviewPoster2017.pptx
+++ b/MoLOverviewPoster2017.pptx
@@ -193,7 +193,7 @@
           <a:p>
             <a:fld id="{B179243D-0E3E-4D4F-90E9-F9F1DBB34143}" type="datetimeFigureOut">
               <a:rPr lang="en-US" smtClean="0"/>
-              <a:t>12/13/17</a:t>
+              <a:t>12/18/17</a:t>
             </a:fld>
             <a:endParaRPr lang="en-US"/>
           </a:p>
@@ -2917,7 +2917,7 @@
               <a:t>version</a:t>
             </a:r>
             <a:r>
-              <a:rPr lang="en-US" sz="2800" dirty="0">
+              <a:rPr lang="en-US" sz="2800">
                 <a:solidFill>
                   <a:sysClr val="windowText" lastClr="000000"/>
                 </a:solidFill>
@@ -2928,6 +2928,28 @@
               <a:t>:</a:t>
             </a:r>
             <a:r>
+              <a:rPr lang="en-US" sz="2800" smtClean="0">
+                <a:solidFill>
+                  <a:sysClr val="windowText" lastClr="000000"/>
+                </a:solidFill>
+                <a:latin typeface="Calibri"/>
+                <a:ea typeface="Calibri"/>
+                <a:cs typeface="Calibri"/>
+              </a:rPr>
+              <a:t> </a:t>
+            </a:r>
+            <a:r>
+              <a:rPr lang="en-US" sz="2800" smtClean="0">
+                <a:solidFill>
+                  <a:sysClr val="windowText" lastClr="000000"/>
+                </a:solidFill>
+                <a:latin typeface="Calibri"/>
+                <a:ea typeface="Calibri"/>
+                <a:cs typeface="Calibri"/>
+              </a:rPr>
+              <a:t>18 </a:t>
+            </a:r>
+            <a:r>
               <a:rPr lang="en-US" sz="2800" dirty="0" smtClean="0">
                 <a:solidFill>
                   <a:sysClr val="windowText" lastClr="000000"/>
@@ -2936,7 +2958,7 @@
                 <a:ea typeface="Calibri"/>
                 <a:cs typeface="Calibri"/>
               </a:rPr>
-              <a:t> 13 December 2017: </a:t>
+              <a:t>December 2017: </a:t>
             </a:r>
             <a:br>
               <a:rPr lang="en-US" sz="2800" dirty="0" smtClean="0">
@@ -4951,11 +4973,7 @@
             </a:r>
             <a:r>
               <a:rPr lang="en-US" sz="2900" dirty="0"/>
-              <a:t>-FNWI] Basic Probability: Programming  </a:t>
-            </a:r>
-            <a:r>
-              <a:rPr lang="en-US" sz="2900" dirty="0"/>
-              <a:t>(</a:t>
+              <a:t>-FNWI] Basic Probability: Programming  (</a:t>
             </a:r>
             <a:r>
               <a:rPr lang="en-US" sz="2900" dirty="0" err="1" smtClean="0"/>
@@ -10898,7 +10916,7 @@
                 <a:ea typeface="Calibri"/>
                 <a:cs typeface="Calibri"/>
               </a:rPr>
-              <a:t>(Can)</a:t>
+              <a:t>(TBA)</a:t>
             </a:r>
             <a:endParaRPr lang="en-US" sz="2900" dirty="0">
               <a:latin typeface="Calibri"/>

</xml_diff>